<commit_message>
Update Projects Ray Tracing / Key Notions
</commit_message>
<xml_diff>
--- a/ONIP/NotionsCles.pptx
+++ b/ONIP/NotionsCles.pptx
@@ -220,7 +220,7 @@
           <a:p>
             <a:fld id="{95F60532-AC81-4152-B45E-E054A978F780}" type="datetimeFigureOut">
               <a:rPr lang="fr-FR" smtClean="0"/>
-              <a:t>04/03/2024</a:t>
+              <a:t>25/03/2024</a:t>
             </a:fld>
             <a:endParaRPr lang="fr-FR"/>
           </a:p>
@@ -509,7 +509,7 @@
           <p:cNvPr id="2" name="Title 1">
             <a:extLst>
               <a:ext uri="{FF2B5EF4-FFF2-40B4-BE49-F238E27FC236}">
-                <a16:creationId xmlns:a16="http://schemas.microsoft.com/office/drawing/2014/main" xmlns="" id="{E0EB8136-4330-4480-80D9-0F6FD970617C}"/>
+                <a16:creationId xmlns="" xmlns:a16="http://schemas.microsoft.com/office/drawing/2014/main" id="{E0EB8136-4330-4480-80D9-0F6FD970617C}"/>
               </a:ext>
             </a:extLst>
           </p:cNvPr>
@@ -548,7 +548,7 @@
           <p:cNvPr id="3" name="Subtitle 2">
             <a:extLst>
               <a:ext uri="{FF2B5EF4-FFF2-40B4-BE49-F238E27FC236}">
-                <a16:creationId xmlns:a16="http://schemas.microsoft.com/office/drawing/2014/main" xmlns="" id="{566E5739-DD96-45FB-B609-3E3447A52FED}"/>
+                <a16:creationId xmlns="" xmlns:a16="http://schemas.microsoft.com/office/drawing/2014/main" id="{566E5739-DD96-45FB-B609-3E3447A52FED}"/>
               </a:ext>
             </a:extLst>
           </p:cNvPr>
@@ -620,7 +620,7 @@
           <p:cNvPr id="4" name="Date Placeholder 3">
             <a:extLst>
               <a:ext uri="{FF2B5EF4-FFF2-40B4-BE49-F238E27FC236}">
-                <a16:creationId xmlns:a16="http://schemas.microsoft.com/office/drawing/2014/main" xmlns="" id="{1B9FF558-51F9-42A2-9944-DBE23DA8B224}"/>
+                <a16:creationId xmlns="" xmlns:a16="http://schemas.microsoft.com/office/drawing/2014/main" id="{1B9FF558-51F9-42A2-9944-DBE23DA8B224}"/>
               </a:ext>
             </a:extLst>
           </p:cNvPr>
@@ -643,7 +643,7 @@
           <a:p>
             <a:fld id="{02AC24A9-CCB6-4F8D-B8DB-C2F3692CFA5A}" type="datetimeFigureOut">
               <a:rPr lang="en-US" smtClean="0"/>
-              <a:t>3/4/2024</a:t>
+              <a:t>3/25/2024</a:t>
             </a:fld>
             <a:endParaRPr lang="en-US" dirty="0"/>
           </a:p>
@@ -654,7 +654,7 @@
           <p:cNvPr id="5" name="Footer Placeholder 4">
             <a:extLst>
               <a:ext uri="{FF2B5EF4-FFF2-40B4-BE49-F238E27FC236}">
-                <a16:creationId xmlns:a16="http://schemas.microsoft.com/office/drawing/2014/main" xmlns="" id="{8B8C0E86-A7F7-4BDC-A637-254E5252DED5}"/>
+                <a16:creationId xmlns="" xmlns:a16="http://schemas.microsoft.com/office/drawing/2014/main" id="{8B8C0E86-A7F7-4BDC-A637-254E5252DED5}"/>
               </a:ext>
             </a:extLst>
           </p:cNvPr>
@@ -679,7 +679,7 @@
           <p:cNvPr id="6" name="Slide Number Placeholder 5">
             <a:extLst>
               <a:ext uri="{FF2B5EF4-FFF2-40B4-BE49-F238E27FC236}">
-                <a16:creationId xmlns:a16="http://schemas.microsoft.com/office/drawing/2014/main" xmlns="" id="{C3D10ADE-E9DA-4E57-BF57-1CCB65219839}"/>
+                <a16:creationId xmlns="" xmlns:a16="http://schemas.microsoft.com/office/drawing/2014/main" id="{C3D10ADE-E9DA-4E57-BF57-1CCB65219839}"/>
               </a:ext>
             </a:extLst>
           </p:cNvPr>
@@ -713,7 +713,7 @@
           <p:cNvPr id="8" name="Rectangle 7">
             <a:extLst>
               <a:ext uri="{FF2B5EF4-FFF2-40B4-BE49-F238E27FC236}">
-                <a16:creationId xmlns:a16="http://schemas.microsoft.com/office/drawing/2014/main" xmlns="" id="{8D06CE56-3881-4ADA-8CEF-D18B02C242A3}"/>
+                <a16:creationId xmlns="" xmlns:a16="http://schemas.microsoft.com/office/drawing/2014/main" id="{8D06CE56-3881-4ADA-8CEF-D18B02C242A3}"/>
               </a:ext>
             </a:extLst>
           </p:cNvPr>
@@ -794,7 +794,7 @@
           <p:cNvPr id="10" name="Rectangle 9">
             <a:extLst>
               <a:ext uri="{FF2B5EF4-FFF2-40B4-BE49-F238E27FC236}">
-                <a16:creationId xmlns:a16="http://schemas.microsoft.com/office/drawing/2014/main" xmlns="" id="{79F3C543-62EC-4433-9C93-A2CD8764E9B4}"/>
+                <a16:creationId xmlns="" xmlns:a16="http://schemas.microsoft.com/office/drawing/2014/main" id="{79F3C543-62EC-4433-9C93-A2CD8764E9B4}"/>
               </a:ext>
             </a:extLst>
           </p:cNvPr>
@@ -909,7 +909,7 @@
           <p:cNvPr id="2" name="Title 1">
             <a:extLst>
               <a:ext uri="{FF2B5EF4-FFF2-40B4-BE49-F238E27FC236}">
-                <a16:creationId xmlns:a16="http://schemas.microsoft.com/office/drawing/2014/main" xmlns="" id="{90B32C18-E430-4EC7-BD7C-99D86D012231}"/>
+                <a16:creationId xmlns="" xmlns:a16="http://schemas.microsoft.com/office/drawing/2014/main" id="{90B32C18-E430-4EC7-BD7C-99D86D012231}"/>
               </a:ext>
             </a:extLst>
           </p:cNvPr>
@@ -938,7 +938,7 @@
           <p:cNvPr id="3" name="Vertical Text Placeholder 2">
             <a:extLst>
               <a:ext uri="{FF2B5EF4-FFF2-40B4-BE49-F238E27FC236}">
-                <a16:creationId xmlns:a16="http://schemas.microsoft.com/office/drawing/2014/main" xmlns="" id="{8FC5012F-7119-4D94-9717-3862E1C9384E}"/>
+                <a16:creationId xmlns="" xmlns:a16="http://schemas.microsoft.com/office/drawing/2014/main" id="{8FC5012F-7119-4D94-9717-3862E1C9384E}"/>
               </a:ext>
             </a:extLst>
           </p:cNvPr>
@@ -995,7 +995,7 @@
           <p:cNvPr id="4" name="Date Placeholder 3">
             <a:extLst>
               <a:ext uri="{FF2B5EF4-FFF2-40B4-BE49-F238E27FC236}">
-                <a16:creationId xmlns:a16="http://schemas.microsoft.com/office/drawing/2014/main" xmlns="" id="{19ED9A4A-D287-4207-9037-70DB007A1707}"/>
+                <a16:creationId xmlns="" xmlns:a16="http://schemas.microsoft.com/office/drawing/2014/main" id="{19ED9A4A-D287-4207-9037-70DB007A1707}"/>
               </a:ext>
             </a:extLst>
           </p:cNvPr>
@@ -1013,7 +1013,7 @@
           <a:p>
             <a:fld id="{02AC24A9-CCB6-4F8D-B8DB-C2F3692CFA5A}" type="datetimeFigureOut">
               <a:rPr lang="en-US" smtClean="0"/>
-              <a:t>3/4/2024</a:t>
+              <a:t>3/25/2024</a:t>
             </a:fld>
             <a:endParaRPr lang="en-US"/>
           </a:p>
@@ -1024,7 +1024,7 @@
           <p:cNvPr id="5" name="Footer Placeholder 4">
             <a:extLst>
               <a:ext uri="{FF2B5EF4-FFF2-40B4-BE49-F238E27FC236}">
-                <a16:creationId xmlns:a16="http://schemas.microsoft.com/office/drawing/2014/main" xmlns="" id="{61ECFCAC-80DB-43BB-B3F1-AC22BACEE360}"/>
+                <a16:creationId xmlns="" xmlns:a16="http://schemas.microsoft.com/office/drawing/2014/main" id="{61ECFCAC-80DB-43BB-B3F1-AC22BACEE360}"/>
               </a:ext>
             </a:extLst>
           </p:cNvPr>
@@ -1049,7 +1049,7 @@
           <p:cNvPr id="6" name="Slide Number Placeholder 5">
             <a:extLst>
               <a:ext uri="{FF2B5EF4-FFF2-40B4-BE49-F238E27FC236}">
-                <a16:creationId xmlns:a16="http://schemas.microsoft.com/office/drawing/2014/main" xmlns="" id="{D7679730-3487-4D94-A0DC-C21684963AB3}"/>
+                <a16:creationId xmlns="" xmlns:a16="http://schemas.microsoft.com/office/drawing/2014/main" id="{D7679730-3487-4D94-A0DC-C21684963AB3}"/>
               </a:ext>
             </a:extLst>
           </p:cNvPr>
@@ -1108,7 +1108,7 @@
           <p:cNvPr id="2" name="Vertical Title 1">
             <a:extLst>
               <a:ext uri="{FF2B5EF4-FFF2-40B4-BE49-F238E27FC236}">
-                <a16:creationId xmlns:a16="http://schemas.microsoft.com/office/drawing/2014/main" xmlns="" id="{B543C89D-929E-4CD1-BCCC-72A14C0335D6}"/>
+                <a16:creationId xmlns="" xmlns:a16="http://schemas.microsoft.com/office/drawing/2014/main" id="{B543C89D-929E-4CD1-BCCC-72A14C0335D6}"/>
               </a:ext>
             </a:extLst>
           </p:cNvPr>
@@ -1142,7 +1142,7 @@
           <p:cNvPr id="3" name="Vertical Text Placeholder 2">
             <a:extLst>
               <a:ext uri="{FF2B5EF4-FFF2-40B4-BE49-F238E27FC236}">
-                <a16:creationId xmlns:a16="http://schemas.microsoft.com/office/drawing/2014/main" xmlns="" id="{FED450EA-A577-4B76-A12F-650BEB20FD8D}"/>
+                <a16:creationId xmlns="" xmlns:a16="http://schemas.microsoft.com/office/drawing/2014/main" id="{FED450EA-A577-4B76-A12F-650BEB20FD8D}"/>
               </a:ext>
             </a:extLst>
           </p:cNvPr>
@@ -1204,7 +1204,7 @@
           <p:cNvPr id="4" name="Date Placeholder 3">
             <a:extLst>
               <a:ext uri="{FF2B5EF4-FFF2-40B4-BE49-F238E27FC236}">
-                <a16:creationId xmlns:a16="http://schemas.microsoft.com/office/drawing/2014/main" xmlns="" id="{41D2603B-9ACE-4FA9-805B-9B91EB63DF7D}"/>
+                <a16:creationId xmlns="" xmlns:a16="http://schemas.microsoft.com/office/drawing/2014/main" id="{41D2603B-9ACE-4FA9-805B-9B91EB63DF7D}"/>
               </a:ext>
             </a:extLst>
           </p:cNvPr>
@@ -1222,7 +1222,7 @@
           <a:p>
             <a:fld id="{02AC24A9-CCB6-4F8D-B8DB-C2F3692CFA5A}" type="datetimeFigureOut">
               <a:rPr lang="en-US" smtClean="0"/>
-              <a:t>3/4/2024</a:t>
+              <a:t>3/25/2024</a:t>
             </a:fld>
             <a:endParaRPr lang="en-US"/>
           </a:p>
@@ -1233,7 +1233,7 @@
           <p:cNvPr id="5" name="Footer Placeholder 4">
             <a:extLst>
               <a:ext uri="{FF2B5EF4-FFF2-40B4-BE49-F238E27FC236}">
-                <a16:creationId xmlns:a16="http://schemas.microsoft.com/office/drawing/2014/main" xmlns="" id="{7ECE18AC-D6A9-4A61-885D-68E2B684A438}"/>
+                <a16:creationId xmlns="" xmlns:a16="http://schemas.microsoft.com/office/drawing/2014/main" id="{7ECE18AC-D6A9-4A61-885D-68E2B684A438}"/>
               </a:ext>
             </a:extLst>
           </p:cNvPr>
@@ -1258,7 +1258,7 @@
           <p:cNvPr id="6" name="Slide Number Placeholder 5">
             <a:extLst>
               <a:ext uri="{FF2B5EF4-FFF2-40B4-BE49-F238E27FC236}">
-                <a16:creationId xmlns:a16="http://schemas.microsoft.com/office/drawing/2014/main" xmlns="" id="{75197AE4-AA47-4E14-8FFE-171FAE47F49E}"/>
+                <a16:creationId xmlns="" xmlns:a16="http://schemas.microsoft.com/office/drawing/2014/main" id="{75197AE4-AA47-4E14-8FFE-171FAE47F49E}"/>
               </a:ext>
             </a:extLst>
           </p:cNvPr>
@@ -1317,7 +1317,7 @@
           <p:cNvPr id="8" name="Rectangle 7">
             <a:extLst>
               <a:ext uri="{FF2B5EF4-FFF2-40B4-BE49-F238E27FC236}">
-                <a16:creationId xmlns:a16="http://schemas.microsoft.com/office/drawing/2014/main" xmlns="" id="{2D6FBB9D-1CAA-4D05-AB33-BABDFE17B843}"/>
+                <a16:creationId xmlns="" xmlns:a16="http://schemas.microsoft.com/office/drawing/2014/main" id="{2D6FBB9D-1CAA-4D05-AB33-BABDFE17B843}"/>
               </a:ext>
             </a:extLst>
           </p:cNvPr>
@@ -1408,7 +1408,7 @@
           <p:cNvPr id="10" name="Rectangle 9">
             <a:extLst>
               <a:ext uri="{FF2B5EF4-FFF2-40B4-BE49-F238E27FC236}">
-                <a16:creationId xmlns:a16="http://schemas.microsoft.com/office/drawing/2014/main" xmlns="" id="{04727B71-B4B6-4823-80A1-68C40B475118}"/>
+                <a16:creationId xmlns="" xmlns:a16="http://schemas.microsoft.com/office/drawing/2014/main" id="{04727B71-B4B6-4823-80A1-68C40B475118}"/>
               </a:ext>
             </a:extLst>
           </p:cNvPr>
@@ -1487,7 +1487,7 @@
           <p:cNvPr id="12" name="Rectangle 11">
             <a:extLst>
               <a:ext uri="{FF2B5EF4-FFF2-40B4-BE49-F238E27FC236}">
-                <a16:creationId xmlns:a16="http://schemas.microsoft.com/office/drawing/2014/main" xmlns="" id="{79A6DB05-9FB5-4B07-8675-74C23D4FD89D}"/>
+                <a16:creationId xmlns="" xmlns:a16="http://schemas.microsoft.com/office/drawing/2014/main" id="{79A6DB05-9FB5-4B07-8675-74C23D4FD89D}"/>
               </a:ext>
             </a:extLst>
           </p:cNvPr>
@@ -1568,7 +1568,7 @@
           <p:cNvPr id="2" name="Title 1">
             <a:extLst>
               <a:ext uri="{FF2B5EF4-FFF2-40B4-BE49-F238E27FC236}">
-                <a16:creationId xmlns:a16="http://schemas.microsoft.com/office/drawing/2014/main" xmlns="" id="{48D358CF-0758-490A-A084-C46443B9ABE8}"/>
+                <a16:creationId xmlns="" xmlns:a16="http://schemas.microsoft.com/office/drawing/2014/main" id="{48D358CF-0758-490A-A084-C46443B9ABE8}"/>
               </a:ext>
             </a:extLst>
           </p:cNvPr>
@@ -1607,7 +1607,7 @@
           <p:cNvPr id="3" name="Content Placeholder 2">
             <a:extLst>
               <a:ext uri="{FF2B5EF4-FFF2-40B4-BE49-F238E27FC236}">
-                <a16:creationId xmlns:a16="http://schemas.microsoft.com/office/drawing/2014/main" xmlns="" id="{21671183-B3CE-4F45-92FB-98290CA0E2CA}"/>
+                <a16:creationId xmlns="" xmlns:a16="http://schemas.microsoft.com/office/drawing/2014/main" id="{21671183-B3CE-4F45-92FB-98290CA0E2CA}"/>
               </a:ext>
             </a:extLst>
           </p:cNvPr>
@@ -1669,7 +1669,7 @@
           <p:cNvPr id="4" name="Date Placeholder 3">
             <a:extLst>
               <a:ext uri="{FF2B5EF4-FFF2-40B4-BE49-F238E27FC236}">
-                <a16:creationId xmlns:a16="http://schemas.microsoft.com/office/drawing/2014/main" xmlns="" id="{3D7DED67-27EC-4D43-A21C-093C1DB04813}"/>
+                <a16:creationId xmlns="" xmlns:a16="http://schemas.microsoft.com/office/drawing/2014/main" id="{3D7DED67-27EC-4D43-A21C-093C1DB04813}"/>
               </a:ext>
             </a:extLst>
           </p:cNvPr>
@@ -1692,7 +1692,7 @@
           <a:p>
             <a:fld id="{02AC24A9-CCB6-4F8D-B8DB-C2F3692CFA5A}" type="datetimeFigureOut">
               <a:rPr lang="en-US" smtClean="0"/>
-              <a:t>3/4/2024</a:t>
+              <a:t>3/25/2024</a:t>
             </a:fld>
             <a:endParaRPr lang="en-US"/>
           </a:p>
@@ -1703,7 +1703,7 @@
           <p:cNvPr id="5" name="Footer Placeholder 4">
             <a:extLst>
               <a:ext uri="{FF2B5EF4-FFF2-40B4-BE49-F238E27FC236}">
-                <a16:creationId xmlns:a16="http://schemas.microsoft.com/office/drawing/2014/main" xmlns="" id="{36747CE3-4890-4BC1-94DB-5D49D02C9933}"/>
+                <a16:creationId xmlns="" xmlns:a16="http://schemas.microsoft.com/office/drawing/2014/main" id="{36747CE3-4890-4BC1-94DB-5D49D02C9933}"/>
               </a:ext>
             </a:extLst>
           </p:cNvPr>
@@ -1728,7 +1728,7 @@
           <p:cNvPr id="6" name="Slide Number Placeholder 5">
             <a:extLst>
               <a:ext uri="{FF2B5EF4-FFF2-40B4-BE49-F238E27FC236}">
-                <a16:creationId xmlns:a16="http://schemas.microsoft.com/office/drawing/2014/main" xmlns="" id="{093C5AD3-D79A-4D46-B25B-822FE0252511}"/>
+                <a16:creationId xmlns="" xmlns:a16="http://schemas.microsoft.com/office/drawing/2014/main" id="{093C5AD3-D79A-4D46-B25B-822FE0252511}"/>
               </a:ext>
             </a:extLst>
           </p:cNvPr>
@@ -1792,7 +1792,7 @@
           <p:cNvPr id="8" name="Rectangle 7">
             <a:extLst>
               <a:ext uri="{FF2B5EF4-FFF2-40B4-BE49-F238E27FC236}">
-                <a16:creationId xmlns:a16="http://schemas.microsoft.com/office/drawing/2014/main" xmlns="" id="{85AEDC5C-2E87-49C6-AB07-A95E5F39ED8E}"/>
+                <a16:creationId xmlns="" xmlns:a16="http://schemas.microsoft.com/office/drawing/2014/main" id="{85AEDC5C-2E87-49C6-AB07-A95E5F39ED8E}"/>
               </a:ext>
             </a:extLst>
           </p:cNvPr>
@@ -1883,7 +1883,7 @@
           <p:cNvPr id="10" name="Rectangle 9">
             <a:extLst>
               <a:ext uri="{FF2B5EF4-FFF2-40B4-BE49-F238E27FC236}">
-                <a16:creationId xmlns:a16="http://schemas.microsoft.com/office/drawing/2014/main" xmlns="" id="{A57D88DE-E462-4C8A-BF99-609390DFB781}"/>
+                <a16:creationId xmlns="" xmlns:a16="http://schemas.microsoft.com/office/drawing/2014/main" id="{A57D88DE-E462-4C8A-BF99-609390DFB781}"/>
               </a:ext>
             </a:extLst>
           </p:cNvPr>
@@ -1964,7 +1964,7 @@
           <p:cNvPr id="2" name="Title 1">
             <a:extLst>
               <a:ext uri="{FF2B5EF4-FFF2-40B4-BE49-F238E27FC236}">
-                <a16:creationId xmlns:a16="http://schemas.microsoft.com/office/drawing/2014/main" xmlns="" id="{B8E44900-E8BF-4B12-8BCB-41076E2B68C7}"/>
+                <a16:creationId xmlns="" xmlns:a16="http://schemas.microsoft.com/office/drawing/2014/main" id="{B8E44900-E8BF-4B12-8BCB-41076E2B68C7}"/>
               </a:ext>
             </a:extLst>
           </p:cNvPr>
@@ -2003,7 +2003,7 @@
           <p:cNvPr id="3" name="Text Placeholder 2">
             <a:extLst>
               <a:ext uri="{FF2B5EF4-FFF2-40B4-BE49-F238E27FC236}">
-                <a16:creationId xmlns:a16="http://schemas.microsoft.com/office/drawing/2014/main" xmlns="" id="{917741F9-B00F-4463-A257-6B66DABD9B4E}"/>
+                <a16:creationId xmlns="" xmlns:a16="http://schemas.microsoft.com/office/drawing/2014/main" id="{917741F9-B00F-4463-A257-6B66DABD9B4E}"/>
               </a:ext>
             </a:extLst>
           </p:cNvPr>
@@ -2128,7 +2128,7 @@
           <p:cNvPr id="4" name="Date Placeholder 3">
             <a:extLst>
               <a:ext uri="{FF2B5EF4-FFF2-40B4-BE49-F238E27FC236}">
-                <a16:creationId xmlns:a16="http://schemas.microsoft.com/office/drawing/2014/main" xmlns="" id="{D48BFA7D-4401-4285-802B-1579165F0D6D}"/>
+                <a16:creationId xmlns="" xmlns:a16="http://schemas.microsoft.com/office/drawing/2014/main" id="{D48BFA7D-4401-4285-802B-1579165F0D6D}"/>
               </a:ext>
             </a:extLst>
           </p:cNvPr>
@@ -2146,7 +2146,7 @@
           <a:p>
             <a:fld id="{02AC24A9-CCB6-4F8D-B8DB-C2F3692CFA5A}" type="datetimeFigureOut">
               <a:rPr lang="en-US" smtClean="0"/>
-              <a:t>3/4/2024</a:t>
+              <a:t>3/25/2024</a:t>
             </a:fld>
             <a:endParaRPr lang="en-US"/>
           </a:p>
@@ -2157,7 +2157,7 @@
           <p:cNvPr id="5" name="Footer Placeholder 4">
             <a:extLst>
               <a:ext uri="{FF2B5EF4-FFF2-40B4-BE49-F238E27FC236}">
-                <a16:creationId xmlns:a16="http://schemas.microsoft.com/office/drawing/2014/main" xmlns="" id="{49A909C5-AA19-4195-8376-9002D5DF4651}"/>
+                <a16:creationId xmlns="" xmlns:a16="http://schemas.microsoft.com/office/drawing/2014/main" id="{49A909C5-AA19-4195-8376-9002D5DF4651}"/>
               </a:ext>
             </a:extLst>
           </p:cNvPr>
@@ -2182,7 +2182,7 @@
           <p:cNvPr id="6" name="Slide Number Placeholder 5">
             <a:extLst>
               <a:ext uri="{FF2B5EF4-FFF2-40B4-BE49-F238E27FC236}">
-                <a16:creationId xmlns:a16="http://schemas.microsoft.com/office/drawing/2014/main" xmlns="" id="{53AC3F32-46E0-47C8-8565-5969A475FDB0}"/>
+                <a16:creationId xmlns="" xmlns:a16="http://schemas.microsoft.com/office/drawing/2014/main" id="{53AC3F32-46E0-47C8-8565-5969A475FDB0}"/>
               </a:ext>
             </a:extLst>
           </p:cNvPr>
@@ -2241,7 +2241,7 @@
           <p:cNvPr id="9" name="Rectangle 8">
             <a:extLst>
               <a:ext uri="{FF2B5EF4-FFF2-40B4-BE49-F238E27FC236}">
-                <a16:creationId xmlns:a16="http://schemas.microsoft.com/office/drawing/2014/main" xmlns="" id="{2076262E-36A0-40C6-ADE6-90CD9FB9B9EA}"/>
+                <a16:creationId xmlns="" xmlns:a16="http://schemas.microsoft.com/office/drawing/2014/main" id="{2076262E-36A0-40C6-ADE6-90CD9FB9B9EA}"/>
               </a:ext>
             </a:extLst>
           </p:cNvPr>
@@ -2332,7 +2332,7 @@
           <p:cNvPr id="11" name="Rectangle 10">
             <a:extLst>
               <a:ext uri="{FF2B5EF4-FFF2-40B4-BE49-F238E27FC236}">
-                <a16:creationId xmlns:a16="http://schemas.microsoft.com/office/drawing/2014/main" xmlns="" id="{42677A9B-4D1D-4D80-912C-24570140A650}"/>
+                <a16:creationId xmlns="" xmlns:a16="http://schemas.microsoft.com/office/drawing/2014/main" id="{42677A9B-4D1D-4D80-912C-24570140A650}"/>
               </a:ext>
             </a:extLst>
           </p:cNvPr>
@@ -2411,7 +2411,7 @@
           <p:cNvPr id="13" name="Rectangle 12">
             <a:extLst>
               <a:ext uri="{FF2B5EF4-FFF2-40B4-BE49-F238E27FC236}">
-                <a16:creationId xmlns:a16="http://schemas.microsoft.com/office/drawing/2014/main" xmlns="" id="{03DC8C98-510F-48C9-82B2-9E4F760A68DF}"/>
+                <a16:creationId xmlns="" xmlns:a16="http://schemas.microsoft.com/office/drawing/2014/main" id="{03DC8C98-510F-48C9-82B2-9E4F760A68DF}"/>
               </a:ext>
             </a:extLst>
           </p:cNvPr>
@@ -2492,7 +2492,7 @@
           <p:cNvPr id="2" name="Title 1">
             <a:extLst>
               <a:ext uri="{FF2B5EF4-FFF2-40B4-BE49-F238E27FC236}">
-                <a16:creationId xmlns:a16="http://schemas.microsoft.com/office/drawing/2014/main" xmlns="" id="{17A078AE-0BC3-48F9-87EC-2DB0CCE7E2AE}"/>
+                <a16:creationId xmlns="" xmlns:a16="http://schemas.microsoft.com/office/drawing/2014/main" id="{17A078AE-0BC3-48F9-87EC-2DB0CCE7E2AE}"/>
               </a:ext>
             </a:extLst>
           </p:cNvPr>
@@ -2531,7 +2531,7 @@
           <p:cNvPr id="3" name="Content Placeholder 2">
             <a:extLst>
               <a:ext uri="{FF2B5EF4-FFF2-40B4-BE49-F238E27FC236}">
-                <a16:creationId xmlns:a16="http://schemas.microsoft.com/office/drawing/2014/main" xmlns="" id="{292A20DF-0829-4336-B59F-FF9D7AA9D8B6}"/>
+                <a16:creationId xmlns="" xmlns:a16="http://schemas.microsoft.com/office/drawing/2014/main" id="{292A20DF-0829-4336-B59F-FF9D7AA9D8B6}"/>
               </a:ext>
             </a:extLst>
           </p:cNvPr>
@@ -2593,7 +2593,7 @@
           <p:cNvPr id="4" name="Content Placeholder 3">
             <a:extLst>
               <a:ext uri="{FF2B5EF4-FFF2-40B4-BE49-F238E27FC236}">
-                <a16:creationId xmlns:a16="http://schemas.microsoft.com/office/drawing/2014/main" xmlns="" id="{7935D01C-CF67-4DF6-B96C-FFC9D5BF847B}"/>
+                <a16:creationId xmlns="" xmlns:a16="http://schemas.microsoft.com/office/drawing/2014/main" id="{7935D01C-CF67-4DF6-B96C-FFC9D5BF847B}"/>
               </a:ext>
             </a:extLst>
           </p:cNvPr>
@@ -2655,7 +2655,7 @@
           <p:cNvPr id="5" name="Date Placeholder 4">
             <a:extLst>
               <a:ext uri="{FF2B5EF4-FFF2-40B4-BE49-F238E27FC236}">
-                <a16:creationId xmlns:a16="http://schemas.microsoft.com/office/drawing/2014/main" xmlns="" id="{29BBD797-6031-4F82-8726-EAB757027FF5}"/>
+                <a16:creationId xmlns="" xmlns:a16="http://schemas.microsoft.com/office/drawing/2014/main" id="{29BBD797-6031-4F82-8726-EAB757027FF5}"/>
               </a:ext>
             </a:extLst>
           </p:cNvPr>
@@ -2678,7 +2678,7 @@
           <a:p>
             <a:fld id="{02AC24A9-CCB6-4F8D-B8DB-C2F3692CFA5A}" type="datetimeFigureOut">
               <a:rPr lang="en-US" smtClean="0"/>
-              <a:t>3/4/2024</a:t>
+              <a:t>3/25/2024</a:t>
             </a:fld>
             <a:endParaRPr lang="en-US"/>
           </a:p>
@@ -2689,7 +2689,7 @@
           <p:cNvPr id="6" name="Footer Placeholder 5">
             <a:extLst>
               <a:ext uri="{FF2B5EF4-FFF2-40B4-BE49-F238E27FC236}">
-                <a16:creationId xmlns:a16="http://schemas.microsoft.com/office/drawing/2014/main" xmlns="" id="{76B3F71C-B897-4909-A75E-8716AD49C156}"/>
+                <a16:creationId xmlns="" xmlns:a16="http://schemas.microsoft.com/office/drawing/2014/main" id="{76B3F71C-B897-4909-A75E-8716AD49C156}"/>
               </a:ext>
             </a:extLst>
           </p:cNvPr>
@@ -2714,7 +2714,7 @@
           <p:cNvPr id="7" name="Slide Number Placeholder 6">
             <a:extLst>
               <a:ext uri="{FF2B5EF4-FFF2-40B4-BE49-F238E27FC236}">
-                <a16:creationId xmlns:a16="http://schemas.microsoft.com/office/drawing/2014/main" xmlns="" id="{4F78BC14-5BB1-405F-A6F3-C07230F085C8}"/>
+                <a16:creationId xmlns="" xmlns:a16="http://schemas.microsoft.com/office/drawing/2014/main" id="{4F78BC14-5BB1-405F-A6F3-C07230F085C8}"/>
               </a:ext>
             </a:extLst>
           </p:cNvPr>
@@ -2778,7 +2778,7 @@
           <p:cNvPr id="11" name="Rectangle 10">
             <a:extLst>
               <a:ext uri="{FF2B5EF4-FFF2-40B4-BE49-F238E27FC236}">
-                <a16:creationId xmlns:a16="http://schemas.microsoft.com/office/drawing/2014/main" xmlns="" id="{6B671BDE-E45C-41A1-9B98-4A607D703855}"/>
+                <a16:creationId xmlns="" xmlns:a16="http://schemas.microsoft.com/office/drawing/2014/main" id="{6B671BDE-E45C-41A1-9B98-4A607D703855}"/>
               </a:ext>
             </a:extLst>
           </p:cNvPr>
@@ -2869,7 +2869,7 @@
           <p:cNvPr id="13" name="Rectangle 12">
             <a:extLst>
               <a:ext uri="{FF2B5EF4-FFF2-40B4-BE49-F238E27FC236}">
-                <a16:creationId xmlns:a16="http://schemas.microsoft.com/office/drawing/2014/main" xmlns="" id="{299500CE-917A-4D03-A7DF-71D8EBBC1537}"/>
+                <a16:creationId xmlns="" xmlns:a16="http://schemas.microsoft.com/office/drawing/2014/main" id="{299500CE-917A-4D03-A7DF-71D8EBBC1537}"/>
               </a:ext>
             </a:extLst>
           </p:cNvPr>
@@ -2948,7 +2948,7 @@
           <p:cNvPr id="15" name="Rectangle 14">
             <a:extLst>
               <a:ext uri="{FF2B5EF4-FFF2-40B4-BE49-F238E27FC236}">
-                <a16:creationId xmlns:a16="http://schemas.microsoft.com/office/drawing/2014/main" xmlns="" id="{C3D0D377-28B0-417D-886B-9483AF064975}"/>
+                <a16:creationId xmlns="" xmlns:a16="http://schemas.microsoft.com/office/drawing/2014/main" id="{C3D0D377-28B0-417D-886B-9483AF064975}"/>
               </a:ext>
             </a:extLst>
           </p:cNvPr>
@@ -3029,7 +3029,7 @@
           <p:cNvPr id="2" name="Title 1">
             <a:extLst>
               <a:ext uri="{FF2B5EF4-FFF2-40B4-BE49-F238E27FC236}">
-                <a16:creationId xmlns:a16="http://schemas.microsoft.com/office/drawing/2014/main" xmlns="" id="{0F8F91F8-0767-40B5-A3AA-72931FC192EA}"/>
+                <a16:creationId xmlns="" xmlns:a16="http://schemas.microsoft.com/office/drawing/2014/main" id="{0F8F91F8-0767-40B5-A3AA-72931FC192EA}"/>
               </a:ext>
             </a:extLst>
           </p:cNvPr>
@@ -3068,7 +3068,7 @@
           <p:cNvPr id="3" name="Text Placeholder 2">
             <a:extLst>
               <a:ext uri="{FF2B5EF4-FFF2-40B4-BE49-F238E27FC236}">
-                <a16:creationId xmlns:a16="http://schemas.microsoft.com/office/drawing/2014/main" xmlns="" id="{AAAE0554-8BEE-4BF6-9519-51B8475D35E1}"/>
+                <a16:creationId xmlns="" xmlns:a16="http://schemas.microsoft.com/office/drawing/2014/main" id="{AAAE0554-8BEE-4BF6-9519-51B8475D35E1}"/>
               </a:ext>
             </a:extLst>
           </p:cNvPr>
@@ -3139,7 +3139,7 @@
           <p:cNvPr id="4" name="Content Placeholder 3">
             <a:extLst>
               <a:ext uri="{FF2B5EF4-FFF2-40B4-BE49-F238E27FC236}">
-                <a16:creationId xmlns:a16="http://schemas.microsoft.com/office/drawing/2014/main" xmlns="" id="{FD4A358D-C930-48E0-B372-06A826B74C47}"/>
+                <a16:creationId xmlns="" xmlns:a16="http://schemas.microsoft.com/office/drawing/2014/main" id="{FD4A358D-C930-48E0-B372-06A826B74C47}"/>
               </a:ext>
             </a:extLst>
           </p:cNvPr>
@@ -3211,7 +3211,7 @@
           <p:cNvPr id="5" name="Text Placeholder 4">
             <a:extLst>
               <a:ext uri="{FF2B5EF4-FFF2-40B4-BE49-F238E27FC236}">
-                <a16:creationId xmlns:a16="http://schemas.microsoft.com/office/drawing/2014/main" xmlns="" id="{83B6615E-4966-4150-83B6-C47591B36383}"/>
+                <a16:creationId xmlns="" xmlns:a16="http://schemas.microsoft.com/office/drawing/2014/main" id="{83B6615E-4966-4150-83B6-C47591B36383}"/>
               </a:ext>
             </a:extLst>
           </p:cNvPr>
@@ -3282,7 +3282,7 @@
           <p:cNvPr id="6" name="Content Placeholder 5">
             <a:extLst>
               <a:ext uri="{FF2B5EF4-FFF2-40B4-BE49-F238E27FC236}">
-                <a16:creationId xmlns:a16="http://schemas.microsoft.com/office/drawing/2014/main" xmlns="" id="{BD409F6B-C17B-4B4F-9F35-5068BDC4E2FD}"/>
+                <a16:creationId xmlns="" xmlns:a16="http://schemas.microsoft.com/office/drawing/2014/main" id="{BD409F6B-C17B-4B4F-9F35-5068BDC4E2FD}"/>
               </a:ext>
             </a:extLst>
           </p:cNvPr>
@@ -3354,7 +3354,7 @@
           <p:cNvPr id="7" name="Date Placeholder 6">
             <a:extLst>
               <a:ext uri="{FF2B5EF4-FFF2-40B4-BE49-F238E27FC236}">
-                <a16:creationId xmlns:a16="http://schemas.microsoft.com/office/drawing/2014/main" xmlns="" id="{C8BC356D-052B-4A9B-8B2F-6665FD325AB3}"/>
+                <a16:creationId xmlns="" xmlns:a16="http://schemas.microsoft.com/office/drawing/2014/main" id="{C8BC356D-052B-4A9B-8B2F-6665FD325AB3}"/>
               </a:ext>
             </a:extLst>
           </p:cNvPr>
@@ -3377,7 +3377,7 @@
           <a:p>
             <a:fld id="{02AC24A9-CCB6-4F8D-B8DB-C2F3692CFA5A}" type="datetimeFigureOut">
               <a:rPr lang="en-US" smtClean="0"/>
-              <a:t>3/4/2024</a:t>
+              <a:t>3/25/2024</a:t>
             </a:fld>
             <a:endParaRPr lang="en-US"/>
           </a:p>
@@ -3388,7 +3388,7 @@
           <p:cNvPr id="8" name="Footer Placeholder 7">
             <a:extLst>
               <a:ext uri="{FF2B5EF4-FFF2-40B4-BE49-F238E27FC236}">
-                <a16:creationId xmlns:a16="http://schemas.microsoft.com/office/drawing/2014/main" xmlns="" id="{69C5E5FA-26A9-467C-93E3-8476142D1D46}"/>
+                <a16:creationId xmlns="" xmlns:a16="http://schemas.microsoft.com/office/drawing/2014/main" id="{69C5E5FA-26A9-467C-93E3-8476142D1D46}"/>
               </a:ext>
             </a:extLst>
           </p:cNvPr>
@@ -3413,7 +3413,7 @@
           <p:cNvPr id="9" name="Slide Number Placeholder 8">
             <a:extLst>
               <a:ext uri="{FF2B5EF4-FFF2-40B4-BE49-F238E27FC236}">
-                <a16:creationId xmlns:a16="http://schemas.microsoft.com/office/drawing/2014/main" xmlns="" id="{D279E50C-1E40-4B48-871B-E392428D20A3}"/>
+                <a16:creationId xmlns="" xmlns:a16="http://schemas.microsoft.com/office/drawing/2014/main" id="{D279E50C-1E40-4B48-871B-E392428D20A3}"/>
               </a:ext>
             </a:extLst>
           </p:cNvPr>
@@ -3477,7 +3477,7 @@
           <p:cNvPr id="7" name="Rectangle 6">
             <a:extLst>
               <a:ext uri="{FF2B5EF4-FFF2-40B4-BE49-F238E27FC236}">
-                <a16:creationId xmlns:a16="http://schemas.microsoft.com/office/drawing/2014/main" xmlns="" id="{8C0689C4-0DB3-408B-A956-40326B4AE4C4}"/>
+                <a16:creationId xmlns="" xmlns:a16="http://schemas.microsoft.com/office/drawing/2014/main" id="{8C0689C4-0DB3-408B-A956-40326B4AE4C4}"/>
               </a:ext>
             </a:extLst>
           </p:cNvPr>
@@ -3568,7 +3568,7 @@
           <p:cNvPr id="9" name="Rectangle 8">
             <a:extLst>
               <a:ext uri="{FF2B5EF4-FFF2-40B4-BE49-F238E27FC236}">
-                <a16:creationId xmlns:a16="http://schemas.microsoft.com/office/drawing/2014/main" xmlns="" id="{56E1D10E-1C30-41BF-8C3B-C460C9B5597B}"/>
+                <a16:creationId xmlns="" xmlns:a16="http://schemas.microsoft.com/office/drawing/2014/main" id="{56E1D10E-1C30-41BF-8C3B-C460C9B5597B}"/>
               </a:ext>
             </a:extLst>
           </p:cNvPr>
@@ -3649,7 +3649,7 @@
           <p:cNvPr id="2" name="Title 1">
             <a:extLst>
               <a:ext uri="{FF2B5EF4-FFF2-40B4-BE49-F238E27FC236}">
-                <a16:creationId xmlns:a16="http://schemas.microsoft.com/office/drawing/2014/main" xmlns="" id="{779454F2-0EE5-4888-AF4C-82F825E6226E}"/>
+                <a16:creationId xmlns="" xmlns:a16="http://schemas.microsoft.com/office/drawing/2014/main" id="{779454F2-0EE5-4888-AF4C-82F825E6226E}"/>
               </a:ext>
             </a:extLst>
           </p:cNvPr>
@@ -3688,7 +3688,7 @@
           <p:cNvPr id="3" name="Date Placeholder 2">
             <a:extLst>
               <a:ext uri="{FF2B5EF4-FFF2-40B4-BE49-F238E27FC236}">
-                <a16:creationId xmlns:a16="http://schemas.microsoft.com/office/drawing/2014/main" xmlns="" id="{67C91241-A315-4643-91E5-CF2C25CC903A}"/>
+                <a16:creationId xmlns="" xmlns:a16="http://schemas.microsoft.com/office/drawing/2014/main" id="{67C91241-A315-4643-91E5-CF2C25CC903A}"/>
               </a:ext>
             </a:extLst>
           </p:cNvPr>
@@ -3706,7 +3706,7 @@
           <a:p>
             <a:fld id="{02AC24A9-CCB6-4F8D-B8DB-C2F3692CFA5A}" type="datetimeFigureOut">
               <a:rPr lang="en-US" smtClean="0"/>
-              <a:t>3/4/2024</a:t>
+              <a:t>3/25/2024</a:t>
             </a:fld>
             <a:endParaRPr lang="en-US"/>
           </a:p>
@@ -3717,7 +3717,7 @@
           <p:cNvPr id="4" name="Footer Placeholder 3">
             <a:extLst>
               <a:ext uri="{FF2B5EF4-FFF2-40B4-BE49-F238E27FC236}">
-                <a16:creationId xmlns:a16="http://schemas.microsoft.com/office/drawing/2014/main" xmlns="" id="{22706D86-5479-487D-94C8-76093D84F377}"/>
+                <a16:creationId xmlns="" xmlns:a16="http://schemas.microsoft.com/office/drawing/2014/main" id="{22706D86-5479-487D-94C8-76093D84F377}"/>
               </a:ext>
             </a:extLst>
           </p:cNvPr>
@@ -3742,7 +3742,7 @@
           <p:cNvPr id="5" name="Slide Number Placeholder 4">
             <a:extLst>
               <a:ext uri="{FF2B5EF4-FFF2-40B4-BE49-F238E27FC236}">
-                <a16:creationId xmlns:a16="http://schemas.microsoft.com/office/drawing/2014/main" xmlns="" id="{A7739411-CED6-43D4-868D-A65C4161A72B}"/>
+                <a16:creationId xmlns="" xmlns:a16="http://schemas.microsoft.com/office/drawing/2014/main" id="{A7739411-CED6-43D4-868D-A65C4161A72B}"/>
               </a:ext>
             </a:extLst>
           </p:cNvPr>
@@ -3801,7 +3801,7 @@
           <p:cNvPr id="2" name="Date Placeholder 1">
             <a:extLst>
               <a:ext uri="{FF2B5EF4-FFF2-40B4-BE49-F238E27FC236}">
-                <a16:creationId xmlns:a16="http://schemas.microsoft.com/office/drawing/2014/main" xmlns="" id="{EAC447E0-1D4D-4EF2-B81B-4B2400EE3EDB}"/>
+                <a16:creationId xmlns="" xmlns:a16="http://schemas.microsoft.com/office/drawing/2014/main" id="{EAC447E0-1D4D-4EF2-B81B-4B2400EE3EDB}"/>
               </a:ext>
             </a:extLst>
           </p:cNvPr>
@@ -3819,7 +3819,7 @@
           <a:p>
             <a:fld id="{02AC24A9-CCB6-4F8D-B8DB-C2F3692CFA5A}" type="datetimeFigureOut">
               <a:rPr lang="en-US" smtClean="0"/>
-              <a:t>3/4/2024</a:t>
+              <a:t>3/25/2024</a:t>
             </a:fld>
             <a:endParaRPr lang="en-US"/>
           </a:p>
@@ -3830,7 +3830,7 @@
           <p:cNvPr id="3" name="Footer Placeholder 2">
             <a:extLst>
               <a:ext uri="{FF2B5EF4-FFF2-40B4-BE49-F238E27FC236}">
-                <a16:creationId xmlns:a16="http://schemas.microsoft.com/office/drawing/2014/main" xmlns="" id="{C9984CA0-2A78-4600-9F3D-19B09E790FE8}"/>
+                <a16:creationId xmlns="" xmlns:a16="http://schemas.microsoft.com/office/drawing/2014/main" id="{C9984CA0-2A78-4600-9F3D-19B09E790FE8}"/>
               </a:ext>
             </a:extLst>
           </p:cNvPr>
@@ -3855,7 +3855,7 @@
           <p:cNvPr id="4" name="Slide Number Placeholder 3">
             <a:extLst>
               <a:ext uri="{FF2B5EF4-FFF2-40B4-BE49-F238E27FC236}">
-                <a16:creationId xmlns:a16="http://schemas.microsoft.com/office/drawing/2014/main" xmlns="" id="{38440955-B18E-49D3-AE7B-B331200E34C5}"/>
+                <a16:creationId xmlns="" xmlns:a16="http://schemas.microsoft.com/office/drawing/2014/main" id="{38440955-B18E-49D3-AE7B-B331200E34C5}"/>
               </a:ext>
             </a:extLst>
           </p:cNvPr>
@@ -3914,7 +3914,7 @@
           <p:cNvPr id="9" name="Rectangle 8">
             <a:extLst>
               <a:ext uri="{FF2B5EF4-FFF2-40B4-BE49-F238E27FC236}">
-                <a16:creationId xmlns:a16="http://schemas.microsoft.com/office/drawing/2014/main" xmlns="" id="{1FA417FE-CD1A-486F-A4AC-E4000A2FB18E}"/>
+                <a16:creationId xmlns="" xmlns:a16="http://schemas.microsoft.com/office/drawing/2014/main" id="{1FA417FE-CD1A-486F-A4AC-E4000A2FB18E}"/>
               </a:ext>
             </a:extLst>
           </p:cNvPr>
@@ -4005,7 +4005,7 @@
           <p:cNvPr id="11" name="Rectangle 10">
             <a:extLst>
               <a:ext uri="{FF2B5EF4-FFF2-40B4-BE49-F238E27FC236}">
-                <a16:creationId xmlns:a16="http://schemas.microsoft.com/office/drawing/2014/main" xmlns="" id="{1318F0F5-812B-472C-9408-B80F2553F5E0}"/>
+                <a16:creationId xmlns="" xmlns:a16="http://schemas.microsoft.com/office/drawing/2014/main" id="{1318F0F5-812B-472C-9408-B80F2553F5E0}"/>
               </a:ext>
             </a:extLst>
           </p:cNvPr>
@@ -4086,7 +4086,7 @@
           <p:cNvPr id="2" name="Title 1">
             <a:extLst>
               <a:ext uri="{FF2B5EF4-FFF2-40B4-BE49-F238E27FC236}">
-                <a16:creationId xmlns:a16="http://schemas.microsoft.com/office/drawing/2014/main" xmlns="" id="{47F7751B-CD8F-4F5B-A903-1DCE5D1E8306}"/>
+                <a16:creationId xmlns="" xmlns:a16="http://schemas.microsoft.com/office/drawing/2014/main" id="{47F7751B-CD8F-4F5B-A903-1DCE5D1E8306}"/>
               </a:ext>
             </a:extLst>
           </p:cNvPr>
@@ -4128,7 +4128,7 @@
           <p:cNvPr id="3" name="Content Placeholder 2">
             <a:extLst>
               <a:ext uri="{FF2B5EF4-FFF2-40B4-BE49-F238E27FC236}">
-                <a16:creationId xmlns:a16="http://schemas.microsoft.com/office/drawing/2014/main" xmlns="" id="{EFA55C8A-A0BB-441D-976F-EB56D4382DB6}"/>
+                <a16:creationId xmlns="" xmlns:a16="http://schemas.microsoft.com/office/drawing/2014/main" id="{EFA55C8A-A0BB-441D-976F-EB56D4382DB6}"/>
               </a:ext>
             </a:extLst>
           </p:cNvPr>
@@ -4218,7 +4218,7 @@
           <p:cNvPr id="4" name="Text Placeholder 3">
             <a:extLst>
               <a:ext uri="{FF2B5EF4-FFF2-40B4-BE49-F238E27FC236}">
-                <a16:creationId xmlns:a16="http://schemas.microsoft.com/office/drawing/2014/main" xmlns="" id="{37DE6A51-A2E5-4BFA-B571-9FDFE1BBFB44}"/>
+                <a16:creationId xmlns="" xmlns:a16="http://schemas.microsoft.com/office/drawing/2014/main" id="{37DE6A51-A2E5-4BFA-B571-9FDFE1BBFB44}"/>
               </a:ext>
             </a:extLst>
           </p:cNvPr>
@@ -4291,7 +4291,7 @@
           <p:cNvPr id="5" name="Date Placeholder 4">
             <a:extLst>
               <a:ext uri="{FF2B5EF4-FFF2-40B4-BE49-F238E27FC236}">
-                <a16:creationId xmlns:a16="http://schemas.microsoft.com/office/drawing/2014/main" xmlns="" id="{3D92778A-DD4C-4651-9C53-8B0C44CD8805}"/>
+                <a16:creationId xmlns="" xmlns:a16="http://schemas.microsoft.com/office/drawing/2014/main" id="{3D92778A-DD4C-4651-9C53-8B0C44CD8805}"/>
               </a:ext>
             </a:extLst>
           </p:cNvPr>
@@ -4314,7 +4314,7 @@
           <a:p>
             <a:fld id="{02AC24A9-CCB6-4F8D-B8DB-C2F3692CFA5A}" type="datetimeFigureOut">
               <a:rPr lang="en-US" smtClean="0"/>
-              <a:t>3/4/2024</a:t>
+              <a:t>3/25/2024</a:t>
             </a:fld>
             <a:endParaRPr lang="en-US" dirty="0"/>
           </a:p>
@@ -4325,7 +4325,7 @@
           <p:cNvPr id="6" name="Footer Placeholder 5">
             <a:extLst>
               <a:ext uri="{FF2B5EF4-FFF2-40B4-BE49-F238E27FC236}">
-                <a16:creationId xmlns:a16="http://schemas.microsoft.com/office/drawing/2014/main" xmlns="" id="{9D6C7F66-2DFA-4146-BE1A-CE2890FE45E2}"/>
+                <a16:creationId xmlns="" xmlns:a16="http://schemas.microsoft.com/office/drawing/2014/main" id="{9D6C7F66-2DFA-4146-BE1A-CE2890FE45E2}"/>
               </a:ext>
             </a:extLst>
           </p:cNvPr>
@@ -4350,7 +4350,7 @@
           <p:cNvPr id="7" name="Slide Number Placeholder 6">
             <a:extLst>
               <a:ext uri="{FF2B5EF4-FFF2-40B4-BE49-F238E27FC236}">
-                <a16:creationId xmlns:a16="http://schemas.microsoft.com/office/drawing/2014/main" xmlns="" id="{D285D185-B1B6-4D62-81BE-BE82C80ACA6C}"/>
+                <a16:creationId xmlns="" xmlns:a16="http://schemas.microsoft.com/office/drawing/2014/main" id="{D285D185-B1B6-4D62-81BE-BE82C80ACA6C}"/>
               </a:ext>
             </a:extLst>
           </p:cNvPr>
@@ -4409,7 +4409,7 @@
           <p:cNvPr id="9" name="Rectangle 8">
             <a:extLst>
               <a:ext uri="{FF2B5EF4-FFF2-40B4-BE49-F238E27FC236}">
-                <a16:creationId xmlns:a16="http://schemas.microsoft.com/office/drawing/2014/main" xmlns="" id="{168B77B5-211C-456E-B79F-306CC3619347}"/>
+                <a16:creationId xmlns="" xmlns:a16="http://schemas.microsoft.com/office/drawing/2014/main" id="{168B77B5-211C-456E-B79F-306CC3619347}"/>
               </a:ext>
             </a:extLst>
           </p:cNvPr>
@@ -4500,7 +4500,7 @@
           <p:cNvPr id="11" name="Rectangle 10">
             <a:extLst>
               <a:ext uri="{FF2B5EF4-FFF2-40B4-BE49-F238E27FC236}">
-                <a16:creationId xmlns:a16="http://schemas.microsoft.com/office/drawing/2014/main" xmlns="" id="{3B63C338-194D-4F23-ABEC-60A7EA96F302}"/>
+                <a16:creationId xmlns="" xmlns:a16="http://schemas.microsoft.com/office/drawing/2014/main" id="{3B63C338-194D-4F23-ABEC-60A7EA96F302}"/>
               </a:ext>
             </a:extLst>
           </p:cNvPr>
@@ -4581,7 +4581,7 @@
           <p:cNvPr id="2" name="Title 1">
             <a:extLst>
               <a:ext uri="{FF2B5EF4-FFF2-40B4-BE49-F238E27FC236}">
-                <a16:creationId xmlns:a16="http://schemas.microsoft.com/office/drawing/2014/main" xmlns="" id="{A0C04DCC-0E3E-4F05-9FAC-9FA6CA4B2BAE}"/>
+                <a16:creationId xmlns="" xmlns:a16="http://schemas.microsoft.com/office/drawing/2014/main" id="{A0C04DCC-0E3E-4F05-9FAC-9FA6CA4B2BAE}"/>
               </a:ext>
             </a:extLst>
           </p:cNvPr>
@@ -4623,7 +4623,7 @@
           <p:cNvPr id="3" name="Picture Placeholder 2">
             <a:extLst>
               <a:ext uri="{FF2B5EF4-FFF2-40B4-BE49-F238E27FC236}">
-                <a16:creationId xmlns:a16="http://schemas.microsoft.com/office/drawing/2014/main" xmlns="" id="{EBA29649-B19F-499E-8E9A-3577EAC8F031}"/>
+                <a16:creationId xmlns="" xmlns:a16="http://schemas.microsoft.com/office/drawing/2014/main" id="{EBA29649-B19F-499E-8E9A-3577EAC8F031}"/>
               </a:ext>
             </a:extLst>
           </p:cNvPr>
@@ -4695,7 +4695,7 @@
           <p:cNvPr id="4" name="Text Placeholder 3">
             <a:extLst>
               <a:ext uri="{FF2B5EF4-FFF2-40B4-BE49-F238E27FC236}">
-                <a16:creationId xmlns:a16="http://schemas.microsoft.com/office/drawing/2014/main" xmlns="" id="{1BC9EF2E-A8CD-41A1-B11A-0D8842797A98}"/>
+                <a16:creationId xmlns="" xmlns:a16="http://schemas.microsoft.com/office/drawing/2014/main" id="{1BC9EF2E-A8CD-41A1-B11A-0D8842797A98}"/>
               </a:ext>
             </a:extLst>
           </p:cNvPr>
@@ -4768,7 +4768,7 @@
           <p:cNvPr id="5" name="Date Placeholder 4">
             <a:extLst>
               <a:ext uri="{FF2B5EF4-FFF2-40B4-BE49-F238E27FC236}">
-                <a16:creationId xmlns:a16="http://schemas.microsoft.com/office/drawing/2014/main" xmlns="" id="{B44257B5-0DE0-401F-9171-E8687A97DBA7}"/>
+                <a16:creationId xmlns="" xmlns:a16="http://schemas.microsoft.com/office/drawing/2014/main" id="{B44257B5-0DE0-401F-9171-E8687A97DBA7}"/>
               </a:ext>
             </a:extLst>
           </p:cNvPr>
@@ -4791,7 +4791,7 @@
           <a:p>
             <a:fld id="{02AC24A9-CCB6-4F8D-B8DB-C2F3692CFA5A}" type="datetimeFigureOut">
               <a:rPr lang="en-US" smtClean="0"/>
-              <a:t>3/4/2024</a:t>
+              <a:t>3/25/2024</a:t>
             </a:fld>
             <a:endParaRPr lang="en-US"/>
           </a:p>
@@ -4802,7 +4802,7 @@
           <p:cNvPr id="6" name="Footer Placeholder 5">
             <a:extLst>
               <a:ext uri="{FF2B5EF4-FFF2-40B4-BE49-F238E27FC236}">
-                <a16:creationId xmlns:a16="http://schemas.microsoft.com/office/drawing/2014/main" xmlns="" id="{788CD9AD-D667-4FD4-AA34-428AA0BCD09E}"/>
+                <a16:creationId xmlns="" xmlns:a16="http://schemas.microsoft.com/office/drawing/2014/main" id="{788CD9AD-D667-4FD4-AA34-428AA0BCD09E}"/>
               </a:ext>
             </a:extLst>
           </p:cNvPr>
@@ -4827,7 +4827,7 @@
           <p:cNvPr id="7" name="Slide Number Placeholder 6">
             <a:extLst>
               <a:ext uri="{FF2B5EF4-FFF2-40B4-BE49-F238E27FC236}">
-                <a16:creationId xmlns:a16="http://schemas.microsoft.com/office/drawing/2014/main" xmlns="" id="{18770FB6-F273-4BA6-8B97-9835AC537871}"/>
+                <a16:creationId xmlns="" xmlns:a16="http://schemas.microsoft.com/office/drawing/2014/main" id="{18770FB6-F273-4BA6-8B97-9835AC537871}"/>
               </a:ext>
             </a:extLst>
           </p:cNvPr>
@@ -4891,7 +4891,7 @@
           <p:cNvPr id="2" name="Title Placeholder 1">
             <a:extLst>
               <a:ext uri="{FF2B5EF4-FFF2-40B4-BE49-F238E27FC236}">
-                <a16:creationId xmlns:a16="http://schemas.microsoft.com/office/drawing/2014/main" xmlns="" id="{BB325BDE-35A4-4AAD-960B-C1415864ADD9}"/>
+                <a16:creationId xmlns="" xmlns:a16="http://schemas.microsoft.com/office/drawing/2014/main" id="{BB325BDE-35A4-4AAD-960B-C1415864ADD9}"/>
               </a:ext>
             </a:extLst>
           </p:cNvPr>
@@ -4930,7 +4930,7 @@
           <p:cNvPr id="3" name="Text Placeholder 2">
             <a:extLst>
               <a:ext uri="{FF2B5EF4-FFF2-40B4-BE49-F238E27FC236}">
-                <a16:creationId xmlns:a16="http://schemas.microsoft.com/office/drawing/2014/main" xmlns="" id="{BE459C78-0CC4-4552-93DD-49B4194D005D}"/>
+                <a16:creationId xmlns="" xmlns:a16="http://schemas.microsoft.com/office/drawing/2014/main" id="{BE459C78-0CC4-4552-93DD-49B4194D005D}"/>
               </a:ext>
             </a:extLst>
           </p:cNvPr>
@@ -4998,7 +4998,7 @@
           <p:cNvPr id="4" name="Date Placeholder 3">
             <a:extLst>
               <a:ext uri="{FF2B5EF4-FFF2-40B4-BE49-F238E27FC236}">
-                <a16:creationId xmlns:a16="http://schemas.microsoft.com/office/drawing/2014/main" xmlns="" id="{06744A3C-9C54-46A6-B3EF-5B36362423EB}"/>
+                <a16:creationId xmlns="" xmlns:a16="http://schemas.microsoft.com/office/drawing/2014/main" id="{06744A3C-9C54-46A6-B3EF-5B36362423EB}"/>
               </a:ext>
             </a:extLst>
           </p:cNvPr>
@@ -5034,7 +5034,7 @@
           <a:p>
             <a:fld id="{02AC24A9-CCB6-4F8D-B8DB-C2F3692CFA5A}" type="datetimeFigureOut">
               <a:rPr lang="en-US" smtClean="0"/>
-              <a:t>3/4/2024</a:t>
+              <a:t>3/25/2024</a:t>
             </a:fld>
             <a:endParaRPr lang="en-US"/>
           </a:p>
@@ -5045,7 +5045,7 @@
           <p:cNvPr id="5" name="Footer Placeholder 4">
             <a:extLst>
               <a:ext uri="{FF2B5EF4-FFF2-40B4-BE49-F238E27FC236}">
-                <a16:creationId xmlns:a16="http://schemas.microsoft.com/office/drawing/2014/main" xmlns="" id="{07D5A696-7B4B-4181-A961-7D66556D507F}"/>
+                <a16:creationId xmlns="" xmlns:a16="http://schemas.microsoft.com/office/drawing/2014/main" id="{07D5A696-7B4B-4181-A961-7D66556D507F}"/>
               </a:ext>
             </a:extLst>
           </p:cNvPr>
@@ -5088,7 +5088,7 @@
           <p:cNvPr id="6" name="Slide Number Placeholder 5">
             <a:extLst>
               <a:ext uri="{FF2B5EF4-FFF2-40B4-BE49-F238E27FC236}">
-                <a16:creationId xmlns:a16="http://schemas.microsoft.com/office/drawing/2014/main" xmlns="" id="{23038CB5-8F4A-401D-A3A9-B27DC15B7A81}"/>
+                <a16:creationId xmlns="" xmlns:a16="http://schemas.microsoft.com/office/drawing/2014/main" id="{23038CB5-8F4A-401D-A3A9-B27DC15B7A81}"/>
               </a:ext>
             </a:extLst>
           </p:cNvPr>
@@ -5464,10 +5464,10 @@
           <p:cNvPr id="9" name="Rectangle 8">
             <a:extLst>
               <a:ext uri="{FF2B5EF4-FFF2-40B4-BE49-F238E27FC236}">
-                <a16:creationId xmlns:a16="http://schemas.microsoft.com/office/drawing/2014/main" xmlns="" id="{526E0BFB-CDF1-4990-8C11-AC849311E0A8}"/>
+                <a16:creationId xmlns="" xmlns:a16="http://schemas.microsoft.com/office/drawing/2014/main" id="{526E0BFB-CDF1-4990-8C11-AC849311E0A8}"/>
               </a:ext>
               <a:ext uri="{C183D7F6-B498-43B3-948B-1728B52AA6E4}">
-                <adec:decorative xmlns:adec="http://schemas.microsoft.com/office/drawing/2017/decorative" xmlns="" val="1"/>
+                <adec:decorative xmlns="" xmlns:adec="http://schemas.microsoft.com/office/drawing/2017/decorative" val="1"/>
               </a:ext>
             </a:extLst>
           </p:cNvPr>
@@ -5477,7 +5477,7 @@
           <p:nvPr>
             <p:extLst>
               <p:ext uri="{386F3935-93C4-4BCD-93E2-E3B085C9AB24}">
-                <p16:designElem xmlns:p16="http://schemas.microsoft.com/office/powerpoint/2015/main" xmlns="" val="1"/>
+                <p16:designElem xmlns="" xmlns:p16="http://schemas.microsoft.com/office/powerpoint/2015/main" val="1"/>
               </p:ext>
             </p:extLst>
           </p:nvPr>
@@ -5524,7 +5524,7 @@
           <p:cNvPr id="4" name="Picture 3">
             <a:extLst>
               <a:ext uri="{FF2B5EF4-FFF2-40B4-BE49-F238E27FC236}">
-                <a16:creationId xmlns:a16="http://schemas.microsoft.com/office/drawing/2014/main" xmlns="" id="{4C72F330-992B-B125-739B-F8303ED3A097}"/>
+                <a16:creationId xmlns="" xmlns:a16="http://schemas.microsoft.com/office/drawing/2014/main" id="{4C72F330-992B-B125-739B-F8303ED3A097}"/>
               </a:ext>
             </a:extLst>
           </p:cNvPr>
@@ -5553,10 +5553,10 @@
           <p:cNvPr id="11" name="Rectangle 10">
             <a:extLst>
               <a:ext uri="{FF2B5EF4-FFF2-40B4-BE49-F238E27FC236}">
-                <a16:creationId xmlns:a16="http://schemas.microsoft.com/office/drawing/2014/main" xmlns="" id="{6069A1F8-9BEB-4786-9694-FC48B2D75D21}"/>
+                <a16:creationId xmlns="" xmlns:a16="http://schemas.microsoft.com/office/drawing/2014/main" id="{6069A1F8-9BEB-4786-9694-FC48B2D75D21}"/>
               </a:ext>
               <a:ext uri="{C183D7F6-B498-43B3-948B-1728B52AA6E4}">
-                <adec:decorative xmlns:adec="http://schemas.microsoft.com/office/drawing/2017/decorative" xmlns="" val="1"/>
+                <adec:decorative xmlns="" xmlns:adec="http://schemas.microsoft.com/office/drawing/2017/decorative" val="1"/>
               </a:ext>
             </a:extLst>
           </p:cNvPr>
@@ -5566,7 +5566,7 @@
           <p:nvPr>
             <p:extLst>
               <p:ext uri="{386F3935-93C4-4BCD-93E2-E3B085C9AB24}">
-                <p16:designElem xmlns:p16="http://schemas.microsoft.com/office/powerpoint/2015/main" xmlns="" val="1"/>
+                <p16:designElem xmlns="" xmlns:p16="http://schemas.microsoft.com/office/powerpoint/2015/main" val="1"/>
               </p:ext>
             </p:extLst>
           </p:nvPr>
@@ -5634,7 +5634,7 @@
           <p:cNvPr id="2" name="Titre 1">
             <a:extLst>
               <a:ext uri="{FF2B5EF4-FFF2-40B4-BE49-F238E27FC236}">
-                <a16:creationId xmlns:a16="http://schemas.microsoft.com/office/drawing/2014/main" xmlns="" id="{CF8D1EB8-F6E7-EB54-1CC8-28472070B9FC}"/>
+                <a16:creationId xmlns="" xmlns:a16="http://schemas.microsoft.com/office/drawing/2014/main" id="{CF8D1EB8-F6E7-EB54-1CC8-28472070B9FC}"/>
               </a:ext>
             </a:extLst>
           </p:cNvPr>
@@ -5670,7 +5670,7 @@
           <p:cNvPr id="3" name="Sous-titre 2">
             <a:extLst>
               <a:ext uri="{FF2B5EF4-FFF2-40B4-BE49-F238E27FC236}">
-                <a16:creationId xmlns:a16="http://schemas.microsoft.com/office/drawing/2014/main" xmlns="" id="{BDFEFAEF-AB6A-BE8F-01E7-845FB609FA07}"/>
+                <a16:creationId xmlns="" xmlns:a16="http://schemas.microsoft.com/office/drawing/2014/main" id="{BDFEFAEF-AB6A-BE8F-01E7-845FB609FA07}"/>
               </a:ext>
             </a:extLst>
           </p:cNvPr>
@@ -5710,10 +5710,10 @@
           <p:cNvPr id="32" name="Rectangle 12">
             <a:extLst>
               <a:ext uri="{FF2B5EF4-FFF2-40B4-BE49-F238E27FC236}">
-                <a16:creationId xmlns:a16="http://schemas.microsoft.com/office/drawing/2014/main" xmlns="" id="{AF2F604E-43BE-4DC3-B983-E071523364F8}"/>
+                <a16:creationId xmlns="" xmlns:a16="http://schemas.microsoft.com/office/drawing/2014/main" id="{AF2F604E-43BE-4DC3-B983-E071523364F8}"/>
               </a:ext>
               <a:ext uri="{C183D7F6-B498-43B3-948B-1728B52AA6E4}">
-                <adec:decorative xmlns:adec="http://schemas.microsoft.com/office/drawing/2017/decorative" xmlns="" val="1"/>
+                <adec:decorative xmlns="" xmlns:adec="http://schemas.microsoft.com/office/drawing/2017/decorative" val="1"/>
               </a:ext>
             </a:extLst>
           </p:cNvPr>
@@ -5723,7 +5723,7 @@
           <p:nvPr>
             <p:extLst>
               <p:ext uri="{386F3935-93C4-4BCD-93E2-E3B085C9AB24}">
-                <p16:designElem xmlns:p16="http://schemas.microsoft.com/office/powerpoint/2015/main" xmlns="" val="1"/>
+                <p16:designElem xmlns="" xmlns:p16="http://schemas.microsoft.com/office/powerpoint/2015/main" val="1"/>
               </p:ext>
             </p:extLst>
           </p:nvPr>
@@ -5802,10 +5802,10 @@
           <p:cNvPr id="33" name="Rectangle 14">
             <a:extLst>
               <a:ext uri="{FF2B5EF4-FFF2-40B4-BE49-F238E27FC236}">
-                <a16:creationId xmlns:a16="http://schemas.microsoft.com/office/drawing/2014/main" xmlns="" id="{08C9B587-E65E-4B52-B37C-ABEBB6E87928}"/>
+                <a16:creationId xmlns="" xmlns:a16="http://schemas.microsoft.com/office/drawing/2014/main" id="{08C9B587-E65E-4B52-B37C-ABEBB6E87928}"/>
               </a:ext>
               <a:ext uri="{C183D7F6-B498-43B3-948B-1728B52AA6E4}">
-                <adec:decorative xmlns:adec="http://schemas.microsoft.com/office/drawing/2017/decorative" xmlns="" val="1"/>
+                <adec:decorative xmlns="" xmlns:adec="http://schemas.microsoft.com/office/drawing/2017/decorative" val="1"/>
               </a:ext>
             </a:extLst>
           </p:cNvPr>
@@ -5815,7 +5815,7 @@
           <p:nvPr>
             <p:extLst>
               <p:ext uri="{386F3935-93C4-4BCD-93E2-E3B085C9AB24}">
-                <p16:designElem xmlns:p16="http://schemas.microsoft.com/office/powerpoint/2015/main" xmlns="" val="1"/>
+                <p16:designElem xmlns="" xmlns:p16="http://schemas.microsoft.com/office/powerpoint/2015/main" val="1"/>
               </p:ext>
             </p:extLst>
           </p:nvPr>
@@ -5895,7 +5895,7 @@
           <p:cNvPr id="5" name="Image 4" descr="Une image contenant texte&#10;&#10;Description générée automatiquement">
             <a:extLst>
               <a:ext uri="{FF2B5EF4-FFF2-40B4-BE49-F238E27FC236}">
-                <a16:creationId xmlns:a16="http://schemas.microsoft.com/office/drawing/2014/main" xmlns="" id="{3037BA79-FF20-6017-2C77-6E9611892AF9}"/>
+                <a16:creationId xmlns="" xmlns:a16="http://schemas.microsoft.com/office/drawing/2014/main" id="{3037BA79-FF20-6017-2C77-6E9611892AF9}"/>
               </a:ext>
             </a:extLst>
           </p:cNvPr>
@@ -5968,7 +5968,7 @@
           <p:cNvPr id="2" name="Titre 1">
             <a:extLst>
               <a:ext uri="{FF2B5EF4-FFF2-40B4-BE49-F238E27FC236}">
-                <a16:creationId xmlns:a16="http://schemas.microsoft.com/office/drawing/2014/main" xmlns="" id="{90162AE8-C1B0-5C56-8313-DEE494F38273}"/>
+                <a16:creationId xmlns="" xmlns:a16="http://schemas.microsoft.com/office/drawing/2014/main" id="{90162AE8-C1B0-5C56-8313-DEE494F38273}"/>
               </a:ext>
             </a:extLst>
           </p:cNvPr>
@@ -5982,13 +5982,32 @@
         <p:spPr/>
         <p:txBody>
           <a:bodyPr>
-            <a:normAutofit/>
+            <a:normAutofit fontScale="90000"/>
           </a:bodyPr>
           <a:lstStyle/>
           <a:p>
             <a:r>
               <a:rPr lang="fr-FR" smtClean="0"/>
-              <a:t>Le doublet de 200 mm de focale</a:t>
+              <a:t>Le doublet de 200 mm de </a:t>
+            </a:r>
+            <a:r>
+              <a:rPr lang="fr-FR"/>
+              <a:t>focale</a:t>
+            </a:r>
+            <a:r>
+              <a:rPr lang="fr-FR"/>
+              <a:t/>
+            </a:r>
+            <a:br>
+              <a:rPr lang="fr-FR"/>
+            </a:br>
+            <a:r>
+              <a:rPr lang="fr-FR" smtClean="0"/>
+              <a:t>Diamètre </a:t>
+            </a:r>
+            <a:r>
+              <a:rPr lang="fr-FR"/>
+              <a:t>: 25 mm</a:t>
             </a:r>
             <a:endParaRPr lang="fr-FR" dirty="0"/>
           </a:p>
@@ -5999,7 +6018,7 @@
           <p:cNvPr id="5" name="Image 4" descr="Une image contenant texte&#10;&#10;Description générée automatiquement">
             <a:extLst>
               <a:ext uri="{FF2B5EF4-FFF2-40B4-BE49-F238E27FC236}">
-                <a16:creationId xmlns:a16="http://schemas.microsoft.com/office/drawing/2014/main" xmlns="" id="{66D2630B-81F4-A4EB-21BA-8B90CF30BD92}"/>
+                <a16:creationId xmlns="" xmlns:a16="http://schemas.microsoft.com/office/drawing/2014/main" id="{66D2630B-81F4-A4EB-21BA-8B90CF30BD92}"/>
               </a:ext>
             </a:extLst>
           </p:cNvPr>
@@ -6549,6 +6568,44 @@
           </a:prstGeom>
         </p:spPr>
       </p:pic>
+      <p:sp>
+        <p:nvSpPr>
+          <p:cNvPr id="9" name="ZoneTexte 8"/>
+          <p:cNvSpPr txBox="1"/>
+          <p:nvPr/>
+        </p:nvSpPr>
+        <p:spPr>
+          <a:xfrm>
+            <a:off x="2195974" y="6450114"/>
+            <a:ext cx="1164101" cy="369332"/>
+          </a:xfrm>
+          <a:prstGeom prst="rect">
+            <a:avLst/>
+          </a:prstGeom>
+          <a:noFill/>
+        </p:spPr>
+        <p:txBody>
+          <a:bodyPr wrap="none" rtlCol="0">
+            <a:spAutoFit/>
+          </a:bodyPr>
+          <a:lstStyle/>
+          <a:p>
+            <a:r>
+              <a:rPr lang="fr-FR" smtClean="0"/>
+              <a:t>(</a:t>
+            </a:r>
+            <a:r>
+              <a:rPr lang="el-GR" smtClean="0"/>
+              <a:t>λ</a:t>
+            </a:r>
+            <a:r>
+              <a:rPr lang="fr-FR" smtClean="0"/>
+              <a:t> en µm)</a:t>
+            </a:r>
+            <a:endParaRPr lang="fr-FR"/>
+          </a:p>
+        </p:txBody>
+      </p:sp>
     </p:spTree>
     <p:extLst>
       <p:ext uri="{BB962C8B-B14F-4D97-AF65-F5344CB8AC3E}">
@@ -6591,7 +6648,7 @@
           <p:cNvPr id="2" name="Titre 1">
             <a:extLst>
               <a:ext uri="{FF2B5EF4-FFF2-40B4-BE49-F238E27FC236}">
-                <a16:creationId xmlns:a16="http://schemas.microsoft.com/office/drawing/2014/main" xmlns="" id="{90162AE8-C1B0-5C56-8313-DEE494F38273}"/>
+                <a16:creationId xmlns="" xmlns:a16="http://schemas.microsoft.com/office/drawing/2014/main" id="{90162AE8-C1B0-5C56-8313-DEE494F38273}"/>
               </a:ext>
             </a:extLst>
           </p:cNvPr>
@@ -6605,13 +6662,32 @@
         <p:spPr/>
         <p:txBody>
           <a:bodyPr>
-            <a:normAutofit/>
+            <a:normAutofit fontScale="90000"/>
           </a:bodyPr>
           <a:lstStyle/>
           <a:p>
             <a:r>
               <a:rPr lang="fr-FR" smtClean="0"/>
-              <a:t>Doublet de 200 mm de focale</a:t>
+              <a:t>Doublet de 200 mm de </a:t>
+            </a:r>
+            <a:r>
+              <a:rPr lang="fr-FR"/>
+              <a:t>focale</a:t>
+            </a:r>
+            <a:r>
+              <a:rPr lang="fr-FR"/>
+              <a:t/>
+            </a:r>
+            <a:br>
+              <a:rPr lang="fr-FR"/>
+            </a:br>
+            <a:r>
+              <a:rPr lang="fr-FR" smtClean="0"/>
+              <a:t>Diamètre </a:t>
+            </a:r>
+            <a:r>
+              <a:rPr lang="fr-FR"/>
+              <a:t>: 25 mm</a:t>
             </a:r>
             <a:endParaRPr lang="fr-FR" dirty="0"/>
           </a:p>
@@ -6622,7 +6698,7 @@
           <p:cNvPr id="5" name="Image 4" descr="Une image contenant texte&#10;&#10;Description générée automatiquement">
             <a:extLst>
               <a:ext uri="{FF2B5EF4-FFF2-40B4-BE49-F238E27FC236}">
-                <a16:creationId xmlns:a16="http://schemas.microsoft.com/office/drawing/2014/main" xmlns="" id="{66D2630B-81F4-A4EB-21BA-8B90CF30BD92}"/>
+                <a16:creationId xmlns="" xmlns:a16="http://schemas.microsoft.com/office/drawing/2014/main" id="{66D2630B-81F4-A4EB-21BA-8B90CF30BD92}"/>
               </a:ext>
             </a:extLst>
           </p:cNvPr>
@@ -6798,7 +6874,7 @@
           <p:cNvPr id="2" name="Titre 1">
             <a:extLst>
               <a:ext uri="{FF2B5EF4-FFF2-40B4-BE49-F238E27FC236}">
-                <a16:creationId xmlns:a16="http://schemas.microsoft.com/office/drawing/2014/main" xmlns="" id="{90162AE8-C1B0-5C56-8313-DEE494F38273}"/>
+                <a16:creationId xmlns="" xmlns:a16="http://schemas.microsoft.com/office/drawing/2014/main" id="{90162AE8-C1B0-5C56-8313-DEE494F38273}"/>
               </a:ext>
             </a:extLst>
           </p:cNvPr>
@@ -6829,7 +6905,7 @@
           <p:cNvPr id="5" name="Image 4" descr="Une image contenant texte&#10;&#10;Description générée automatiquement">
             <a:extLst>
               <a:ext uri="{FF2B5EF4-FFF2-40B4-BE49-F238E27FC236}">
-                <a16:creationId xmlns:a16="http://schemas.microsoft.com/office/drawing/2014/main" xmlns="" id="{66D2630B-81F4-A4EB-21BA-8B90CF30BD92}"/>
+                <a16:creationId xmlns="" xmlns:a16="http://schemas.microsoft.com/office/drawing/2014/main" id="{66D2630B-81F4-A4EB-21BA-8B90CF30BD92}"/>
               </a:ext>
             </a:extLst>
           </p:cNvPr>
@@ -7177,7 +7253,7 @@
           <p:cNvPr id="2" name="Titre 1">
             <a:extLst>
               <a:ext uri="{FF2B5EF4-FFF2-40B4-BE49-F238E27FC236}">
-                <a16:creationId xmlns:a16="http://schemas.microsoft.com/office/drawing/2014/main" xmlns="" id="{90162AE8-C1B0-5C56-8313-DEE494F38273}"/>
+                <a16:creationId xmlns="" xmlns:a16="http://schemas.microsoft.com/office/drawing/2014/main" id="{90162AE8-C1B0-5C56-8313-DEE494F38273}"/>
               </a:ext>
             </a:extLst>
           </p:cNvPr>
@@ -7208,7 +7284,7 @@
           <p:cNvPr id="5" name="Image 4" descr="Une image contenant texte&#10;&#10;Description générée automatiquement">
             <a:extLst>
               <a:ext uri="{FF2B5EF4-FFF2-40B4-BE49-F238E27FC236}">
-                <a16:creationId xmlns:a16="http://schemas.microsoft.com/office/drawing/2014/main" xmlns="" id="{66D2630B-81F4-A4EB-21BA-8B90CF30BD92}"/>
+                <a16:creationId xmlns="" xmlns:a16="http://schemas.microsoft.com/office/drawing/2014/main" id="{66D2630B-81F4-A4EB-21BA-8B90CF30BD92}"/>
               </a:ext>
             </a:extLst>
           </p:cNvPr>
@@ -7458,7 +7534,7 @@
           <p:cNvPr id="2" name="Titre 1">
             <a:extLst>
               <a:ext uri="{FF2B5EF4-FFF2-40B4-BE49-F238E27FC236}">
-                <a16:creationId xmlns:a16="http://schemas.microsoft.com/office/drawing/2014/main" xmlns="" id="{90162AE8-C1B0-5C56-8313-DEE494F38273}"/>
+                <a16:creationId xmlns="" xmlns:a16="http://schemas.microsoft.com/office/drawing/2014/main" id="{90162AE8-C1B0-5C56-8313-DEE494F38273}"/>
               </a:ext>
             </a:extLst>
           </p:cNvPr>
@@ -7489,7 +7565,7 @@
           <p:cNvPr id="3" name="Espace réservé du contenu 2">
             <a:extLst>
               <a:ext uri="{FF2B5EF4-FFF2-40B4-BE49-F238E27FC236}">
-                <a16:creationId xmlns:a16="http://schemas.microsoft.com/office/drawing/2014/main" xmlns="" id="{E0BBB9DE-019C-C741-F224-494739D4B752}"/>
+                <a16:creationId xmlns="" xmlns:a16="http://schemas.microsoft.com/office/drawing/2014/main" id="{E0BBB9DE-019C-C741-F224-494739D4B752}"/>
               </a:ext>
             </a:extLst>
           </p:cNvPr>
@@ -7564,7 +7640,7 @@
           <p:cNvPr id="5" name="Image 4" descr="Une image contenant texte&#10;&#10;Description générée automatiquement">
             <a:extLst>
               <a:ext uri="{FF2B5EF4-FFF2-40B4-BE49-F238E27FC236}">
-                <a16:creationId xmlns:a16="http://schemas.microsoft.com/office/drawing/2014/main" xmlns="" id="{66D2630B-81F4-A4EB-21BA-8B90CF30BD92}"/>
+                <a16:creationId xmlns="" xmlns:a16="http://schemas.microsoft.com/office/drawing/2014/main" id="{66D2630B-81F4-A4EB-21BA-8B90CF30BD92}"/>
               </a:ext>
             </a:extLst>
           </p:cNvPr>
@@ -7637,7 +7713,7 @@
           <p:cNvPr id="2" name="Titre 1">
             <a:extLst>
               <a:ext uri="{FF2B5EF4-FFF2-40B4-BE49-F238E27FC236}">
-                <a16:creationId xmlns:a16="http://schemas.microsoft.com/office/drawing/2014/main" xmlns="" id="{90162AE8-C1B0-5C56-8313-DEE494F38273}"/>
+                <a16:creationId xmlns="" xmlns:a16="http://schemas.microsoft.com/office/drawing/2014/main" id="{90162AE8-C1B0-5C56-8313-DEE494F38273}"/>
               </a:ext>
             </a:extLst>
           </p:cNvPr>
@@ -7655,15 +7731,7 @@
           <a:p>
             <a:r>
               <a:rPr lang="fr-FR" smtClean="0"/>
-              <a:t>L’a</a:t>
-            </a:r>
-            <a:r>
-              <a:rPr lang="fr-FR" smtClean="0"/>
-              <a:t>berration </a:t>
-            </a:r>
-            <a:r>
-              <a:rPr lang="fr-FR" smtClean="0"/>
-              <a:t>sphérique</a:t>
+              <a:t>L’aberration sphérique</a:t>
             </a:r>
             <a:endParaRPr lang="fr-FR" dirty="0"/>
           </a:p>
@@ -7674,7 +7742,7 @@
           <p:cNvPr id="5" name="Image 4" descr="Une image contenant texte&#10;&#10;Description générée automatiquement">
             <a:extLst>
               <a:ext uri="{FF2B5EF4-FFF2-40B4-BE49-F238E27FC236}">
-                <a16:creationId xmlns:a16="http://schemas.microsoft.com/office/drawing/2014/main" xmlns="" id="{66D2630B-81F4-A4EB-21BA-8B90CF30BD92}"/>
+                <a16:creationId xmlns="" xmlns:a16="http://schemas.microsoft.com/office/drawing/2014/main" id="{66D2630B-81F4-A4EB-21BA-8B90CF30BD92}"/>
               </a:ext>
             </a:extLst>
           </p:cNvPr>
@@ -8294,7 +8362,7 @@
           <p:cNvPr id="3" name="Espace réservé du contenu 2">
             <a:extLst>
               <a:ext uri="{FF2B5EF4-FFF2-40B4-BE49-F238E27FC236}">
-                <a16:creationId xmlns:a16="http://schemas.microsoft.com/office/drawing/2014/main" xmlns="" id="{E0BBB9DE-019C-C741-F224-494739D4B752}"/>
+                <a16:creationId xmlns="" xmlns:a16="http://schemas.microsoft.com/office/drawing/2014/main" id="{E0BBB9DE-019C-C741-F224-494739D4B752}"/>
               </a:ext>
             </a:extLst>
           </p:cNvPr>
@@ -8602,7 +8670,7 @@
           <p:cNvPr id="2" name="Titre 1">
             <a:extLst>
               <a:ext uri="{FF2B5EF4-FFF2-40B4-BE49-F238E27FC236}">
-                <a16:creationId xmlns:a16="http://schemas.microsoft.com/office/drawing/2014/main" xmlns="" id="{90162AE8-C1B0-5C56-8313-DEE494F38273}"/>
+                <a16:creationId xmlns="" xmlns:a16="http://schemas.microsoft.com/office/drawing/2014/main" id="{90162AE8-C1B0-5C56-8313-DEE494F38273}"/>
               </a:ext>
             </a:extLst>
           </p:cNvPr>
@@ -8631,7 +8699,7 @@
           <p:cNvPr id="3" name="Espace réservé du contenu 2">
             <a:extLst>
               <a:ext uri="{FF2B5EF4-FFF2-40B4-BE49-F238E27FC236}">
-                <a16:creationId xmlns:a16="http://schemas.microsoft.com/office/drawing/2014/main" xmlns="" id="{E0BBB9DE-019C-C741-F224-494739D4B752}"/>
+                <a16:creationId xmlns="" xmlns:a16="http://schemas.microsoft.com/office/drawing/2014/main" id="{E0BBB9DE-019C-C741-F224-494739D4B752}"/>
               </a:ext>
             </a:extLst>
           </p:cNvPr>
@@ -8673,7 +8741,7 @@
           <p:cNvPr id="5" name="Image 4" descr="Une image contenant texte&#10;&#10;Description générée automatiquement">
             <a:extLst>
               <a:ext uri="{FF2B5EF4-FFF2-40B4-BE49-F238E27FC236}">
-                <a16:creationId xmlns:a16="http://schemas.microsoft.com/office/drawing/2014/main" xmlns="" id="{66D2630B-81F4-A4EB-21BA-8B90CF30BD92}"/>
+                <a16:creationId xmlns="" xmlns:a16="http://schemas.microsoft.com/office/drawing/2014/main" id="{66D2630B-81F4-A4EB-21BA-8B90CF30BD92}"/>
               </a:ext>
             </a:extLst>
           </p:cNvPr>
@@ -9612,7 +9680,7 @@
           <p:cNvPr id="2" name="Titre 1">
             <a:extLst>
               <a:ext uri="{FF2B5EF4-FFF2-40B4-BE49-F238E27FC236}">
-                <a16:creationId xmlns:a16="http://schemas.microsoft.com/office/drawing/2014/main" xmlns="" id="{90162AE8-C1B0-5C56-8313-DEE494F38273}"/>
+                <a16:creationId xmlns="" xmlns:a16="http://schemas.microsoft.com/office/drawing/2014/main" id="{90162AE8-C1B0-5C56-8313-DEE494F38273}"/>
               </a:ext>
             </a:extLst>
           </p:cNvPr>
@@ -9643,7 +9711,7 @@
           <p:cNvPr id="3" name="Espace réservé du contenu 2">
             <a:extLst>
               <a:ext uri="{FF2B5EF4-FFF2-40B4-BE49-F238E27FC236}">
-                <a16:creationId xmlns:a16="http://schemas.microsoft.com/office/drawing/2014/main" xmlns="" id="{E0BBB9DE-019C-C741-F224-494739D4B752}"/>
+                <a16:creationId xmlns="" xmlns:a16="http://schemas.microsoft.com/office/drawing/2014/main" id="{E0BBB9DE-019C-C741-F224-494739D4B752}"/>
               </a:ext>
             </a:extLst>
           </p:cNvPr>
@@ -9670,16 +9738,11 @@
               <a:rPr lang="fr-FR" sz="2400" smtClean="0"/>
               <a:t>La lentille simple pour un point objet sur l’axe en monochromatique</a:t>
             </a:r>
-            <a:endParaRPr lang="fr-FR" sz="2400" smtClean="0"/>
           </a:p>
           <a:p>
             <a:r>
               <a:rPr lang="fr-FR" sz="2400"/>
-              <a:t>Le doublet pour un point objet sur l’axe </a:t>
-            </a:r>
-            <a:r>
-              <a:rPr lang="fr-FR" sz="2400"/>
-              <a:t>en </a:t>
+              <a:t>Le doublet pour un point objet sur l’axe en </a:t>
             </a:r>
             <a:r>
               <a:rPr lang="fr-FR" sz="2400" smtClean="0"/>
@@ -9718,7 +9781,7 @@
           <p:cNvPr id="5" name="Image 4" descr="Une image contenant texte&#10;&#10;Description générée automatiquement">
             <a:extLst>
               <a:ext uri="{FF2B5EF4-FFF2-40B4-BE49-F238E27FC236}">
-                <a16:creationId xmlns:a16="http://schemas.microsoft.com/office/drawing/2014/main" xmlns="" id="{66D2630B-81F4-A4EB-21BA-8B90CF30BD92}"/>
+                <a16:creationId xmlns="" xmlns:a16="http://schemas.microsoft.com/office/drawing/2014/main" id="{66D2630B-81F4-A4EB-21BA-8B90CF30BD92}"/>
               </a:ext>
             </a:extLst>
           </p:cNvPr>
@@ -9791,7 +9854,7 @@
           <p:cNvPr id="2" name="Titre 1">
             <a:extLst>
               <a:ext uri="{FF2B5EF4-FFF2-40B4-BE49-F238E27FC236}">
-                <a16:creationId xmlns:a16="http://schemas.microsoft.com/office/drawing/2014/main" xmlns="" id="{90162AE8-C1B0-5C56-8313-DEE494F38273}"/>
+                <a16:creationId xmlns="" xmlns:a16="http://schemas.microsoft.com/office/drawing/2014/main" id="{90162AE8-C1B0-5C56-8313-DEE494F38273}"/>
               </a:ext>
             </a:extLst>
           </p:cNvPr>
@@ -9805,13 +9868,24 @@
         <p:spPr/>
         <p:txBody>
           <a:bodyPr>
-            <a:normAutofit/>
+            <a:normAutofit fontScale="90000"/>
           </a:bodyPr>
           <a:lstStyle/>
           <a:p>
             <a:r>
               <a:rPr lang="fr-FR" smtClean="0"/>
-              <a:t>La lentille simple de 200 mm de focale</a:t>
+              <a:t>La lentille simple de 200 mm de </a:t>
+            </a:r>
+            <a:r>
+              <a:rPr lang="fr-FR" smtClean="0"/>
+              <a:t>focale</a:t>
+            </a:r>
+            <a:br>
+              <a:rPr lang="fr-FR" smtClean="0"/>
+            </a:br>
+            <a:r>
+              <a:rPr lang="fr-FR" smtClean="0"/>
+              <a:t>Diamètre de la lentille : 25 mm</a:t>
             </a:r>
             <a:endParaRPr lang="fr-FR" dirty="0"/>
           </a:p>
@@ -9822,7 +9896,7 @@
           <p:cNvPr id="5" name="Image 4" descr="Une image contenant texte&#10;&#10;Description générée automatiquement">
             <a:extLst>
               <a:ext uri="{FF2B5EF4-FFF2-40B4-BE49-F238E27FC236}">
-                <a16:creationId xmlns:a16="http://schemas.microsoft.com/office/drawing/2014/main" xmlns="" id="{66D2630B-81F4-A4EB-21BA-8B90CF30BD92}"/>
+                <a16:creationId xmlns="" xmlns:a16="http://schemas.microsoft.com/office/drawing/2014/main" id="{66D2630B-81F4-A4EB-21BA-8B90CF30BD92}"/>
               </a:ext>
             </a:extLst>
           </p:cNvPr>
@@ -10755,6 +10829,44 @@
           </a:p>
         </p:txBody>
       </p:sp>
+      <p:sp>
+        <p:nvSpPr>
+          <p:cNvPr id="4" name="ZoneTexte 3"/>
+          <p:cNvSpPr txBox="1"/>
+          <p:nvPr/>
+        </p:nvSpPr>
+        <p:spPr>
+          <a:xfrm>
+            <a:off x="2195974" y="6450114"/>
+            <a:ext cx="1164101" cy="369332"/>
+          </a:xfrm>
+          <a:prstGeom prst="rect">
+            <a:avLst/>
+          </a:prstGeom>
+          <a:noFill/>
+        </p:spPr>
+        <p:txBody>
+          <a:bodyPr wrap="none" rtlCol="0">
+            <a:spAutoFit/>
+          </a:bodyPr>
+          <a:lstStyle/>
+          <a:p>
+            <a:r>
+              <a:rPr lang="fr-FR" smtClean="0"/>
+              <a:t>(</a:t>
+            </a:r>
+            <a:r>
+              <a:rPr lang="el-GR" smtClean="0"/>
+              <a:t>λ</a:t>
+            </a:r>
+            <a:r>
+              <a:rPr lang="fr-FR" smtClean="0"/>
+              <a:t> en µm)</a:t>
+            </a:r>
+            <a:endParaRPr lang="fr-FR"/>
+          </a:p>
+        </p:txBody>
+      </p:sp>
     </p:spTree>
     <p:extLst>
       <p:ext uri="{BB962C8B-B14F-4D97-AF65-F5344CB8AC3E}">
@@ -10821,7 +10933,7 @@
           <p:cNvPr id="2" name="Titre 1">
             <a:extLst>
               <a:ext uri="{FF2B5EF4-FFF2-40B4-BE49-F238E27FC236}">
-                <a16:creationId xmlns:a16="http://schemas.microsoft.com/office/drawing/2014/main" xmlns="" id="{90162AE8-C1B0-5C56-8313-DEE494F38273}"/>
+                <a16:creationId xmlns="" xmlns:a16="http://schemas.microsoft.com/office/drawing/2014/main" id="{90162AE8-C1B0-5C56-8313-DEE494F38273}"/>
               </a:ext>
             </a:extLst>
           </p:cNvPr>
@@ -10835,13 +10947,24 @@
         <p:spPr/>
         <p:txBody>
           <a:bodyPr>
-            <a:normAutofit/>
+            <a:normAutofit fontScale="90000"/>
           </a:bodyPr>
           <a:lstStyle/>
           <a:p>
             <a:r>
               <a:rPr lang="fr-FR" smtClean="0"/>
-              <a:t>La lentille simple de 200 mm de focale</a:t>
+              <a:t>La lentille simple de 200 mm de </a:t>
+            </a:r>
+            <a:r>
+              <a:rPr lang="fr-FR"/>
+              <a:t>focale</a:t>
+            </a:r>
+            <a:br>
+              <a:rPr lang="fr-FR"/>
+            </a:br>
+            <a:r>
+              <a:rPr lang="fr-FR"/>
+              <a:t>Diamètre de la lentille : 25 mm</a:t>
             </a:r>
             <a:endParaRPr lang="fr-FR" dirty="0"/>
           </a:p>
@@ -10852,7 +10975,7 @@
           <p:cNvPr id="5" name="Image 4" descr="Une image contenant texte&#10;&#10;Description générée automatiquement">
             <a:extLst>
               <a:ext uri="{FF2B5EF4-FFF2-40B4-BE49-F238E27FC236}">
-                <a16:creationId xmlns:a16="http://schemas.microsoft.com/office/drawing/2014/main" xmlns="" id="{66D2630B-81F4-A4EB-21BA-8B90CF30BD92}"/>
+                <a16:creationId xmlns="" xmlns:a16="http://schemas.microsoft.com/office/drawing/2014/main" id="{66D2630B-81F4-A4EB-21BA-8B90CF30BD92}"/>
               </a:ext>
             </a:extLst>
           </p:cNvPr>
@@ -11284,7 +11407,7 @@
           <p:cNvPr id="2" name="Titre 1">
             <a:extLst>
               <a:ext uri="{FF2B5EF4-FFF2-40B4-BE49-F238E27FC236}">
-                <a16:creationId xmlns:a16="http://schemas.microsoft.com/office/drawing/2014/main" xmlns="" id="{90162AE8-C1B0-5C56-8313-DEE494F38273}"/>
+                <a16:creationId xmlns="" xmlns:a16="http://schemas.microsoft.com/office/drawing/2014/main" id="{90162AE8-C1B0-5C56-8313-DEE494F38273}"/>
               </a:ext>
             </a:extLst>
           </p:cNvPr>
@@ -11315,7 +11438,7 @@
           <p:cNvPr id="5" name="Image 4" descr="Une image contenant texte&#10;&#10;Description générée automatiquement">
             <a:extLst>
               <a:ext uri="{FF2B5EF4-FFF2-40B4-BE49-F238E27FC236}">
-                <a16:creationId xmlns:a16="http://schemas.microsoft.com/office/drawing/2014/main" xmlns="" id="{66D2630B-81F4-A4EB-21BA-8B90CF30BD92}"/>
+                <a16:creationId xmlns="" xmlns:a16="http://schemas.microsoft.com/office/drawing/2014/main" id="{66D2630B-81F4-A4EB-21BA-8B90CF30BD92}"/>
               </a:ext>
             </a:extLst>
           </p:cNvPr>
@@ -12263,6 +12386,44 @@
           </a:p>
         </p:txBody>
       </p:sp>
+      <p:sp>
+        <p:nvSpPr>
+          <p:cNvPr id="23" name="ZoneTexte 22"/>
+          <p:cNvSpPr txBox="1"/>
+          <p:nvPr/>
+        </p:nvSpPr>
+        <p:spPr>
+          <a:xfrm>
+            <a:off x="2195974" y="6450114"/>
+            <a:ext cx="1164101" cy="369332"/>
+          </a:xfrm>
+          <a:prstGeom prst="rect">
+            <a:avLst/>
+          </a:prstGeom>
+          <a:noFill/>
+        </p:spPr>
+        <p:txBody>
+          <a:bodyPr wrap="none" rtlCol="0">
+            <a:spAutoFit/>
+          </a:bodyPr>
+          <a:lstStyle/>
+          <a:p>
+            <a:r>
+              <a:rPr lang="fr-FR" smtClean="0"/>
+              <a:t>(</a:t>
+            </a:r>
+            <a:r>
+              <a:rPr lang="el-GR" smtClean="0"/>
+              <a:t>λ</a:t>
+            </a:r>
+            <a:r>
+              <a:rPr lang="fr-FR" smtClean="0"/>
+              <a:t> en µm)</a:t>
+            </a:r>
+            <a:endParaRPr lang="fr-FR"/>
+          </a:p>
+        </p:txBody>
+      </p:sp>
     </p:spTree>
     <p:extLst>
       <p:ext uri="{BB962C8B-B14F-4D97-AF65-F5344CB8AC3E}">
@@ -12305,7 +12466,7 @@
           <p:cNvPr id="2" name="Titre 1">
             <a:extLst>
               <a:ext uri="{FF2B5EF4-FFF2-40B4-BE49-F238E27FC236}">
-                <a16:creationId xmlns:a16="http://schemas.microsoft.com/office/drawing/2014/main" xmlns="" id="{90162AE8-C1B0-5C56-8313-DEE494F38273}"/>
+                <a16:creationId xmlns="" xmlns:a16="http://schemas.microsoft.com/office/drawing/2014/main" id="{90162AE8-C1B0-5C56-8313-DEE494F38273}"/>
               </a:ext>
             </a:extLst>
           </p:cNvPr>
@@ -12617,7 +12778,7 @@
           <p:cNvPr id="5" name="Image 4" descr="Une image contenant texte&#10;&#10;Description générée automatiquement">
             <a:extLst>
               <a:ext uri="{FF2B5EF4-FFF2-40B4-BE49-F238E27FC236}">
-                <a16:creationId xmlns:a16="http://schemas.microsoft.com/office/drawing/2014/main" xmlns="" id="{66D2630B-81F4-A4EB-21BA-8B90CF30BD92}"/>
+                <a16:creationId xmlns="" xmlns:a16="http://schemas.microsoft.com/office/drawing/2014/main" id="{66D2630B-81F4-A4EB-21BA-8B90CF30BD92}"/>
               </a:ext>
             </a:extLst>
           </p:cNvPr>

</xml_diff>